<commit_message>
small fixes in the task description
</commit_message>
<xml_diff>
--- a/slides/4. Introduction to Ethics Theories.pptx
+++ b/slides/4. Introduction to Ethics Theories.pptx
@@ -29701,7 +29701,7 @@
           </a:ln>
           <a:extLst>
             <a:ext uri="{FAA26D3D-D897-4be2-8F04-BA451C77F1D7}">
-              <ma14:placeholderFlag xmlns="" xmlns:ma14="http://schemas.microsoft.com/office/mac/drawingml/2011/main" val="1"/>
+              <ma14:placeholderFlag xmlns:ma14="http://schemas.microsoft.com/office/mac/drawingml/2011/main" xmlns="" val="1"/>
             </a:ext>
           </a:extLst>
         </p:spPr>
@@ -32094,14 +32094,19 @@
             <p:ph idx="1"/>
           </p:nvPr>
         </p:nvSpPr>
-        <p:spPr/>
+        <p:spPr>
+          <a:xfrm>
+            <a:off x="478369" y="1653116"/>
+            <a:ext cx="11009336" cy="4751917"/>
+          </a:xfrm>
+        </p:spPr>
         <p:txBody>
           <a:bodyPr/>
           <a:lstStyle/>
           <a:p>
             <a:r>
               <a:rPr lang="en-US" dirty="0"/>
-              <a:t>How would you express and address (mitigate) the ethical dilemma according to each theory?</a:t>
+              <a:t>How would you express and address (mitigate) your project’s particular ethical dilemmas according to each theory? (one or two sentences for each)</a:t>
             </a:r>
           </a:p>
           <a:p>
@@ -32151,11 +32156,8 @@
             </a:pPr>
             <a:r>
               <a:rPr lang="en-US" dirty="0"/>
-              <a:t>For the social engineering ethics, associate your comments with the answers from the previous tasks. Add references to your claims or definitions.</a:t>
-            </a:r>
-          </a:p>
-          <a:p>
-            <a:endParaRPr lang="en-US" dirty="0"/>
+              <a:t>For the Social Ethics of Engineering, please associate your comments with the answers from the previous tasks. Add references to your claims or definitions.</a:t>
+            </a:r>
           </a:p>
         </p:txBody>
       </p:sp>

</xml_diff>